<commit_message>
C#\Lab2\Rewrote slides. Now officially finished
</commit_message>
<xml_diff>
--- a/C#/Lab2/Підсумки другої лабораторної роботи.pptx
+++ b/C#/Lab2/Підсумки другої лабораторної роботи.pptx
@@ -279,7 +279,7 @@
           <a:p>
             <a:fld id="{6444479B-705B-4489-957E-7E8A228BDFA0}" type="datetime1">
               <a:rPr lang="en-US" smtClean="0"/>
-              <a:t>11/17/2025</a:t>
+              <a:t>11/20/2025</a:t>
             </a:fld>
             <a:endParaRPr lang="en-US"/>
           </a:p>
@@ -479,7 +479,7 @@
           <a:p>
             <a:fld id="{C07B66AD-7C08-490A-ADA4-B47E10FB2407}" type="datetime1">
               <a:rPr lang="en-US" smtClean="0"/>
-              <a:t>11/17/2025</a:t>
+              <a:t>11/20/2025</a:t>
             </a:fld>
             <a:endParaRPr lang="en-US"/>
           </a:p>
@@ -738,7 +738,7 @@
           <a:p>
             <a:fld id="{05B95027-4255-49E7-9841-CD21BCC99996}" type="datetime1">
               <a:rPr lang="en-US" smtClean="0"/>
-              <a:t>11/17/2025</a:t>
+              <a:t>11/20/2025</a:t>
             </a:fld>
             <a:endParaRPr lang="en-US"/>
           </a:p>
@@ -979,7 +979,7 @@
           <a:p>
             <a:fld id="{9F89F774-3FA6-43B8-9241-99959C8FD463}" type="datetime1">
               <a:rPr lang="en-US" smtClean="0"/>
-              <a:t>11/17/2025</a:t>
+              <a:t>11/20/2025</a:t>
             </a:fld>
             <a:endParaRPr lang="en-US"/>
           </a:p>
@@ -1306,7 +1306,7 @@
           <a:p>
             <a:fld id="{F9504452-5DCC-4FE2-A5C9-8A5EF6714D65}" type="datetime1">
               <a:rPr lang="en-US" smtClean="0"/>
-              <a:t>11/17/2025</a:t>
+              <a:t>11/20/2025</a:t>
             </a:fld>
             <a:endParaRPr lang="en-US"/>
           </a:p>
@@ -1616,7 +1616,7 @@
           <a:p>
             <a:fld id="{E579ABC2-0180-4F3A-A895-A85BC724D472}" type="datetime1">
               <a:rPr lang="en-US" smtClean="0"/>
-              <a:t>11/17/2025</a:t>
+              <a:t>11/20/2025</a:t>
             </a:fld>
             <a:endParaRPr lang="en-US"/>
           </a:p>
@@ -2034,7 +2034,7 @@
           <a:p>
             <a:fld id="{6AEEA9BA-4E8F-439E-BEA4-91FBA01E3F5F}" type="datetime1">
               <a:rPr lang="en-US" smtClean="0"/>
-              <a:t>11/17/2025</a:t>
+              <a:t>11/20/2025</a:t>
             </a:fld>
             <a:endParaRPr lang="en-US"/>
           </a:p>
@@ -2176,7 +2176,7 @@
           <a:p>
             <a:fld id="{BE15BF18-0007-481C-AA29-413124BC3EE7}" type="datetime1">
               <a:rPr lang="en-US" smtClean="0"/>
-              <a:t>11/17/2025</a:t>
+              <a:t>11/20/2025</a:t>
             </a:fld>
             <a:endParaRPr lang="en-US"/>
           </a:p>
@@ -2338,7 +2338,7 @@
           <a:p>
             <a:fld id="{09BE9870-3748-43AD-B547-02A075CB4A1D}" type="datetime1">
               <a:rPr lang="en-US" smtClean="0"/>
-              <a:t>11/17/2025</a:t>
+              <a:t>11/20/2025</a:t>
             </a:fld>
             <a:endParaRPr lang="en-US"/>
           </a:p>
@@ -2655,7 +2655,7 @@
           <a:p>
             <a:fld id="{558E7897-33C5-4F1A-9307-D068E37F3DC7}" type="datetime1">
               <a:rPr lang="en-US" smtClean="0"/>
-              <a:t>11/17/2025</a:t>
+              <a:t>11/20/2025</a:t>
             </a:fld>
             <a:endParaRPr lang="en-US"/>
           </a:p>
@@ -2950,7 +2950,7 @@
           <a:p>
             <a:fld id="{82E171BA-CC09-47C8-A6DF-F5C5CB59CEEC}" type="datetime1">
               <a:rPr lang="en-US" smtClean="0"/>
-              <a:t>11/17/2025</a:t>
+              <a:t>11/20/2025</a:t>
             </a:fld>
             <a:endParaRPr lang="en-US"/>
           </a:p>
@@ -3191,7 +3191,7 @@
           <a:p>
             <a:fld id="{7DA38F49-B3E2-4BF0-BEC7-C30D34ABBB8D}" type="datetime1">
               <a:rPr lang="en-US" smtClean="0"/>
-              <a:t>11/17/2025</a:t>
+              <a:t>11/20/2025</a:t>
             </a:fld>
             <a:endParaRPr lang="en-US"/>
           </a:p>
@@ -4224,19 +4224,17 @@
       </p:sp>
       <p:pic>
         <p:nvPicPr>
-          <p:cNvPr id="5" name="Місце для вмісту 4">
-            <a:extLst>
-              <a:ext uri="{FF2B5EF4-FFF2-40B4-BE49-F238E27FC236}">
-                <a16:creationId xmlns:a16="http://schemas.microsoft.com/office/drawing/2014/main" id="{084D61EC-E49A-40FA-2368-4AAA71F60301}"/>
+          <p:cNvPr id="8" name="Рисунок 7">
+            <a:extLst>
+              <a:ext uri="{FF2B5EF4-FFF2-40B4-BE49-F238E27FC236}">
+                <a16:creationId xmlns:a16="http://schemas.microsoft.com/office/drawing/2014/main" id="{BEDE4D82-DBF0-F09D-E5DF-03B14290681F}"/>
               </a:ext>
             </a:extLst>
           </p:cNvPr>
           <p:cNvPicPr>
-            <a:picLocks noGrp="1" noChangeAspect="1"/>
+            <a:picLocks noChangeAspect="1"/>
           </p:cNvPicPr>
-          <p:nvPr>
-            <p:ph idx="1"/>
-          </p:nvPr>
+          <p:nvPr/>
         </p:nvPicPr>
         <p:blipFill>
           <a:blip r:embed="rId2"/>
@@ -4246,8 +4244,8 @@
         </p:blipFill>
         <p:spPr>
           <a:xfrm>
-            <a:off x="639171" y="2464560"/>
-            <a:ext cx="10891837" cy="1924560"/>
+            <a:off x="640078" y="2468880"/>
+            <a:ext cx="10569521" cy="2103119"/>
           </a:xfrm>
           <a:prstGeom prst="rect">
             <a:avLst/>
@@ -4256,10 +4254,10 @@
       </p:pic>
       <p:pic>
         <p:nvPicPr>
-          <p:cNvPr id="7" name="Рисунок 6">
-            <a:extLst>
-              <a:ext uri="{FF2B5EF4-FFF2-40B4-BE49-F238E27FC236}">
-                <a16:creationId xmlns:a16="http://schemas.microsoft.com/office/drawing/2014/main" id="{E2643D08-D5BA-3F56-CAEA-1285EFB9602A}"/>
+          <p:cNvPr id="10" name="Рисунок 9">
+            <a:extLst>
+              <a:ext uri="{FF2B5EF4-FFF2-40B4-BE49-F238E27FC236}">
+                <a16:creationId xmlns:a16="http://schemas.microsoft.com/office/drawing/2014/main" id="{718F6FB0-A0AE-2397-8B30-7EE0DEC442BE}"/>
               </a:ext>
             </a:extLst>
           </p:cNvPr>
@@ -4276,8 +4274,8 @@
         </p:blipFill>
         <p:spPr>
           <a:xfrm>
-            <a:off x="639171" y="4705985"/>
-            <a:ext cx="6648450" cy="1733550"/>
+            <a:off x="657225" y="4721224"/>
+            <a:ext cx="6550883" cy="1537335"/>
           </a:xfrm>
           <a:prstGeom prst="rect">
             <a:avLst/>
@@ -4345,19 +4343,17 @@
       </p:sp>
       <p:pic>
         <p:nvPicPr>
-          <p:cNvPr id="5" name="Місце для вмісту 4">
-            <a:extLst>
-              <a:ext uri="{FF2B5EF4-FFF2-40B4-BE49-F238E27FC236}">
-                <a16:creationId xmlns:a16="http://schemas.microsoft.com/office/drawing/2014/main" id="{0512A9D5-0EBE-EFFB-CABE-74D8DA36B0B9}"/>
+          <p:cNvPr id="8" name="Рисунок 7">
+            <a:extLst>
+              <a:ext uri="{FF2B5EF4-FFF2-40B4-BE49-F238E27FC236}">
+                <a16:creationId xmlns:a16="http://schemas.microsoft.com/office/drawing/2014/main" id="{068E1C6D-317E-892F-4ACE-5BCB42013D52}"/>
               </a:ext>
             </a:extLst>
           </p:cNvPr>
           <p:cNvPicPr>
-            <a:picLocks noGrp="1" noChangeAspect="1"/>
+            <a:picLocks noChangeAspect="1"/>
           </p:cNvPicPr>
-          <p:nvPr>
-            <p:ph idx="1"/>
-          </p:nvPr>
+          <p:nvPr/>
         </p:nvPicPr>
         <p:blipFill>
           <a:blip r:embed="rId2"/>
@@ -4367,8 +4363,8 @@
         </p:blipFill>
         <p:spPr>
           <a:xfrm>
-            <a:off x="660992" y="2468881"/>
-            <a:ext cx="9510670" cy="1523999"/>
+            <a:off x="640078" y="2468880"/>
+            <a:ext cx="9540401" cy="1818639"/>
           </a:xfrm>
           <a:prstGeom prst="rect">
             <a:avLst/>
@@ -4377,10 +4373,10 @@
       </p:pic>
       <p:pic>
         <p:nvPicPr>
-          <p:cNvPr id="7" name="Рисунок 6">
-            <a:extLst>
-              <a:ext uri="{FF2B5EF4-FFF2-40B4-BE49-F238E27FC236}">
-                <a16:creationId xmlns:a16="http://schemas.microsoft.com/office/drawing/2014/main" id="{A3FA167F-3FBC-114D-C70D-5E5E5080CB95}"/>
+          <p:cNvPr id="10" name="Рисунок 9">
+            <a:extLst>
+              <a:ext uri="{FF2B5EF4-FFF2-40B4-BE49-F238E27FC236}">
+                <a16:creationId xmlns:a16="http://schemas.microsoft.com/office/drawing/2014/main" id="{DE8CD3F4-E324-5868-C30D-BD75CAFEC18E}"/>
               </a:ext>
             </a:extLst>
           </p:cNvPr>
@@ -4397,8 +4393,8 @@
         </p:blipFill>
         <p:spPr>
           <a:xfrm>
-            <a:off x="640079" y="4333875"/>
-            <a:ext cx="5730241" cy="760958"/>
+            <a:off x="640077" y="4655185"/>
+            <a:ext cx="6167123" cy="696705"/>
           </a:xfrm>
           <a:prstGeom prst="rect">
             <a:avLst/>
@@ -4948,453 +4944,307 @@
         </p:spPr>
         <p:txBody>
           <a:bodyPr anchor="t">
-            <a:normAutofit/>
+            <a:normAutofit fontScale="85000" lnSpcReduction="10000"/>
           </a:bodyPr>
           <a:lstStyle/>
           <a:p>
-            <a:pPr>
-              <a:lnSpc>
-                <a:spcPct val="110000"/>
-              </a:lnSpc>
-            </a:pPr>
-            <a:r>
-              <a:rPr lang="en-GB" sz="1400" dirty="0"/>
-              <a:t>Participants: *id, name, transport, </a:t>
-            </a:r>
-            <a:r>
-              <a:rPr lang="en-GB" sz="1400" dirty="0" err="1"/>
+            <a:r>
+              <a:rPr lang="en-GB" dirty="0"/>
+              <a:t>Event: *id, </a:t>
+            </a:r>
+            <a:r>
+              <a:rPr lang="en-GB" dirty="0" err="1"/>
+              <a:t>administrator_id</a:t>
+            </a:r>
+            <a:r>
+              <a:rPr lang="en-GB" dirty="0"/>
+              <a:t>, title, date, description.</a:t>
+            </a:r>
+          </a:p>
+          <a:p>
+            <a:r>
+              <a:rPr lang="en-GB" dirty="0" err="1"/>
+              <a:t>EventBlock</a:t>
+            </a:r>
+            <a:r>
+              <a:rPr lang="en-GB" dirty="0"/>
+              <a:t>: *id, </a:t>
+            </a:r>
+            <a:r>
+              <a:rPr lang="en-GB" dirty="0" err="1"/>
+              <a:t>team_id</a:t>
+            </a:r>
+            <a:r>
+              <a:rPr lang="en-GB" dirty="0"/>
+              <a:t>, </a:t>
+            </a:r>
+            <a:r>
+              <a:rPr lang="en-GB" dirty="0" err="1"/>
+              <a:t>zone_activation_id</a:t>
+            </a:r>
+            <a:r>
+              <a:rPr lang="en-GB" dirty="0"/>
+              <a:t>, name, type, </a:t>
+            </a:r>
+            <a:r>
+              <a:rPr lang="en-GB" dirty="0" err="1"/>
+              <a:t>starts_at</a:t>
+            </a:r>
+            <a:r>
+              <a:rPr lang="en-GB" dirty="0"/>
+              <a:t>, </a:t>
+            </a:r>
+            <a:r>
+              <a:rPr lang="en-GB" dirty="0" err="1"/>
+              <a:t>ends_at</a:t>
+            </a:r>
+            <a:r>
+              <a:rPr lang="en-GB" dirty="0"/>
+              <a:t>.</a:t>
+            </a:r>
+          </a:p>
+          <a:p>
+            <a:r>
+              <a:rPr lang="en-GB" dirty="0"/>
+              <a:t>Team: *id, name, </a:t>
+            </a:r>
+            <a:r>
+              <a:rPr lang="en-GB" dirty="0" err="1"/>
+              <a:t>contact_number</a:t>
+            </a:r>
+            <a:r>
+              <a:rPr lang="en-GB" dirty="0"/>
+              <a:t>, transport, </a:t>
+            </a:r>
+            <a:r>
+              <a:rPr lang="en-GB" dirty="0" err="1"/>
               <a:t>arrives_at</a:t>
             </a:r>
             <a:r>
-              <a:rPr lang="en-GB" sz="1400" dirty="0"/>
+              <a:rPr lang="en-GB" dirty="0"/>
               <a:t>, </a:t>
             </a:r>
             <a:r>
-              <a:rPr lang="en-GB" sz="1400" dirty="0" err="1"/>
+              <a:rPr lang="en-GB" dirty="0" err="1"/>
               <a:t>hand_color</a:t>
             </a:r>
             <a:r>
-              <a:rPr lang="en-GB" sz="1400" dirty="0"/>
+              <a:rPr lang="en-GB" dirty="0"/>
+              <a:t>, notes.</a:t>
+            </a:r>
+          </a:p>
+          <a:p>
+            <a:r>
+              <a:rPr lang="en-GB" dirty="0"/>
+              <a:t>TeamMember: *id, </a:t>
+            </a:r>
+            <a:r>
+              <a:rPr lang="en-GB" dirty="0" err="1"/>
+              <a:t>team_id</a:t>
+            </a:r>
+            <a:r>
+              <a:rPr lang="en-GB" dirty="0"/>
               <a:t>, </a:t>
             </a:r>
             <a:r>
-              <a:rPr lang="en-GB" sz="1400" dirty="0" err="1"/>
+              <a:rPr lang="en-GB" dirty="0" err="1"/>
+              <a:t>ticket_id</a:t>
+            </a:r>
+            <a:r>
+              <a:rPr lang="en-GB" dirty="0"/>
+              <a:t>, role.  </a:t>
+            </a:r>
+          </a:p>
+          <a:p>
+            <a:r>
+              <a:rPr lang="en-GB" dirty="0"/>
+              <a:t>Ticket: *id, </a:t>
+            </a:r>
+            <a:r>
+              <a:rPr lang="en-GB" dirty="0" err="1"/>
+              <a:t>event_id</a:t>
+            </a:r>
+            <a:r>
+              <a:rPr lang="en-GB" dirty="0"/>
+              <a:t>, </a:t>
+            </a:r>
+            <a:r>
+              <a:rPr lang="en-GB" dirty="0" err="1"/>
+              <a:t>qr_code</a:t>
+            </a:r>
+            <a:r>
+              <a:rPr lang="en-GB" dirty="0"/>
+              <a:t>, </a:t>
+            </a:r>
+            <a:r>
+              <a:rPr lang="en-GB" dirty="0" err="1"/>
+              <a:t>buyer_name</a:t>
+            </a:r>
+            <a:r>
+              <a:rPr lang="en-GB" dirty="0"/>
+              <a:t>, </a:t>
+            </a:r>
+            <a:r>
+              <a:rPr lang="en-GB" dirty="0" err="1"/>
+              <a:t>buyer_contact_number</a:t>
+            </a:r>
+            <a:r>
+              <a:rPr lang="en-GB" dirty="0"/>
+              <a:t>.  </a:t>
+            </a:r>
+          </a:p>
+          <a:p>
+            <a:r>
+              <a:rPr lang="en-GB" dirty="0"/>
+              <a:t>Administrator: *id, name, </a:t>
+            </a:r>
+            <a:r>
+              <a:rPr lang="en-GB" dirty="0" err="1"/>
               <a:t>contact_number</a:t>
             </a:r>
             <a:r>
-              <a:rPr lang="en-GB" sz="1400" dirty="0"/>
+              <a:rPr lang="en-GB" dirty="0"/>
+              <a:t>.  </a:t>
+            </a:r>
+          </a:p>
+          <a:p>
+            <a:r>
+              <a:rPr lang="en-GB" dirty="0"/>
+              <a:t>Partner: *id, name, </a:t>
+            </a:r>
+            <a:r>
+              <a:rPr lang="en-GB" dirty="0" err="1"/>
+              <a:t>contact_number</a:t>
+            </a:r>
+            <a:r>
+              <a:rPr lang="en-GB" dirty="0"/>
+              <a:t>, description.</a:t>
+            </a:r>
+          </a:p>
+          <a:p>
+            <a:r>
+              <a:rPr lang="en-GB" dirty="0"/>
+              <a:t>Zone: *id, name, type, location.</a:t>
+            </a:r>
+          </a:p>
+          <a:p>
+            <a:r>
+              <a:rPr lang="en-GB" dirty="0" err="1"/>
+              <a:t>ZoneActivation</a:t>
+            </a:r>
+            <a:r>
+              <a:rPr lang="en-GB" dirty="0"/>
+              <a:t>: *id, </a:t>
+            </a:r>
+            <a:r>
+              <a:rPr lang="en-GB" dirty="0" err="1"/>
+              <a:t>partner_id</a:t>
+            </a:r>
+            <a:r>
+              <a:rPr lang="en-GB" dirty="0"/>
+              <a:t>, </a:t>
+            </a:r>
+            <a:r>
+              <a:rPr lang="en-GB" dirty="0" err="1"/>
+              <a:t>zone_id</a:t>
+            </a:r>
+            <a:r>
+              <a:rPr lang="en-GB" dirty="0"/>
+              <a:t>, </a:t>
+            </a:r>
+            <a:r>
+              <a:rPr lang="en-GB" dirty="0" err="1"/>
+              <a:t>event_id</a:t>
+            </a:r>
+            <a:r>
+              <a:rPr lang="en-GB" dirty="0"/>
               <a:t>, notes.</a:t>
             </a:r>
           </a:p>
           <a:p>
-            <a:pPr>
-              <a:lnSpc>
-                <a:spcPct val="110000"/>
-              </a:lnSpc>
-            </a:pPr>
-            <a:r>
-              <a:rPr lang="en-GB" sz="1400" dirty="0" err="1"/>
-              <a:t>TeamMembers</a:t>
-            </a:r>
-            <a:r>
-              <a:rPr lang="en-GB" sz="1400" dirty="0"/>
+            <a:r>
+              <a:rPr lang="en-GB" dirty="0"/>
+              <a:t>Worker: *id, name, </a:t>
+            </a:r>
+            <a:r>
+              <a:rPr lang="en-GB" dirty="0" err="1"/>
+              <a:t>contact_number</a:t>
+            </a:r>
+            <a:r>
+              <a:rPr lang="en-GB" dirty="0"/>
+              <a:t>, role, salary.</a:t>
+            </a:r>
+          </a:p>
+          <a:p>
+            <a:r>
+              <a:rPr lang="en-GB" dirty="0" err="1"/>
+              <a:t>WorkerShift</a:t>
+            </a:r>
+            <a:r>
+              <a:rPr lang="en-GB" dirty="0"/>
               <a:t>: *id, </a:t>
             </a:r>
             <a:r>
-              <a:rPr lang="en-GB" sz="1400" dirty="0" err="1"/>
-              <a:t>participant_id</a:t>
-            </a:r>
-            <a:r>
-              <a:rPr lang="en-GB" sz="1400" dirty="0"/>
-              <a:t>, name, role, </a:t>
-            </a:r>
-            <a:r>
-              <a:rPr lang="en-GB" sz="1400" dirty="0" err="1"/>
-              <a:t>contact_number</a:t>
-            </a:r>
-            <a:r>
-              <a:rPr lang="en-GB" sz="1400" dirty="0"/>
+              <a:rPr lang="en-GB" dirty="0" err="1"/>
+              <a:t>worker_id</a:t>
+            </a:r>
+            <a:r>
+              <a:rPr lang="en-GB" dirty="0"/>
+              <a:t>, </a:t>
+            </a:r>
+            <a:r>
+              <a:rPr lang="en-GB" dirty="0" err="1"/>
+              <a:t>zone_activation_id</a:t>
+            </a:r>
+            <a:r>
+              <a:rPr lang="en-GB" dirty="0"/>
+              <a:t>, </a:t>
+            </a:r>
+            <a:r>
+              <a:rPr lang="en-GB" dirty="0" err="1"/>
+              <a:t>starts_at</a:t>
+            </a:r>
+            <a:r>
+              <a:rPr lang="en-GB" dirty="0"/>
+              <a:t>, </a:t>
+            </a:r>
+            <a:r>
+              <a:rPr lang="en-GB" dirty="0" err="1"/>
+              <a:t>ends_at</a:t>
+            </a:r>
+            <a:r>
+              <a:rPr lang="en-GB" dirty="0"/>
               <a:t>.</a:t>
             </a:r>
           </a:p>
           <a:p>
-            <a:pPr>
-              <a:lnSpc>
-                <a:spcPct val="110000"/>
-              </a:lnSpc>
-            </a:pPr>
-            <a:r>
-              <a:rPr lang="en-GB" sz="1400" dirty="0"/>
-              <a:t>Accreditations: *id, </a:t>
-            </a:r>
-            <a:r>
-              <a:rPr lang="en-GB" sz="1400" dirty="0" err="1"/>
-              <a:t>team_member_id</a:t>
-            </a:r>
-            <a:r>
-              <a:rPr lang="en-GB" sz="1400" dirty="0"/>
+            <a:r>
+              <a:rPr lang="en-GB" dirty="0"/>
+              <a:t>Incident: *id, </a:t>
+            </a:r>
+            <a:r>
+              <a:rPr lang="en-GB" dirty="0" err="1"/>
+              <a:t>ticket_id</a:t>
+            </a:r>
+            <a:r>
+              <a:rPr lang="en-GB" dirty="0"/>
+              <a:t>, type, description, </a:t>
+            </a:r>
+            <a:r>
+              <a:rPr lang="en-GB" dirty="0" err="1"/>
+              <a:t>happened_at</a:t>
+            </a:r>
+            <a:r>
+              <a:rPr lang="en-GB" dirty="0"/>
               <a:t>, </a:t>
             </a:r>
             <a:r>
-              <a:rPr lang="en-GB" sz="1400" dirty="0" err="1"/>
-              <a:t>valid_from</a:t>
-            </a:r>
-            <a:r>
-              <a:rPr lang="en-GB" sz="1400" dirty="0"/>
-              <a:t>, </a:t>
-            </a:r>
-            <a:r>
-              <a:rPr lang="en-GB" sz="1400" dirty="0" err="1"/>
-              <a:t>valid_to</a:t>
-            </a:r>
-            <a:r>
-              <a:rPr lang="en-GB" sz="1400" dirty="0"/>
+              <a:rPr lang="en-GB" dirty="0" err="1"/>
+              <a:t>is_resolved</a:t>
+            </a:r>
+            <a:r>
+              <a:rPr lang="en-GB" dirty="0"/>
               <a:t>.</a:t>
-            </a:r>
-          </a:p>
-          <a:p>
-            <a:pPr>
-              <a:lnSpc>
-                <a:spcPct val="110000"/>
-              </a:lnSpc>
-            </a:pPr>
-            <a:r>
-              <a:rPr lang="en-GB" sz="1400" dirty="0"/>
-              <a:t>Stages: *id, name, location, capacity.</a:t>
-            </a:r>
-          </a:p>
-          <a:p>
-            <a:pPr>
-              <a:lnSpc>
-                <a:spcPct val="110000"/>
-              </a:lnSpc>
-            </a:pPr>
-            <a:r>
-              <a:rPr lang="en-GB" sz="1400" dirty="0"/>
-              <a:t>Performances: *id, </a:t>
-            </a:r>
-            <a:r>
-              <a:rPr lang="en-GB" sz="1400" dirty="0" err="1"/>
-              <a:t>participant_id</a:t>
-            </a:r>
-            <a:r>
-              <a:rPr lang="en-GB" sz="1400" dirty="0"/>
-              <a:t>, </a:t>
-            </a:r>
-            <a:r>
-              <a:rPr lang="en-GB" sz="1400" dirty="0" err="1"/>
-              <a:t>stage_id</a:t>
-            </a:r>
-            <a:r>
-              <a:rPr lang="en-GB" sz="1400" dirty="0"/>
-              <a:t>, </a:t>
-            </a:r>
-            <a:r>
-              <a:rPr lang="en-GB" sz="1400" dirty="0" err="1"/>
-              <a:t>starts_at</a:t>
-            </a:r>
-            <a:r>
-              <a:rPr lang="en-GB" sz="1400" dirty="0"/>
-              <a:t>, </a:t>
-            </a:r>
-            <a:r>
-              <a:rPr lang="en-GB" sz="1400" dirty="0" err="1"/>
-              <a:t>ends_at</a:t>
-            </a:r>
-            <a:r>
-              <a:rPr lang="en-GB" sz="1400" dirty="0"/>
-              <a:t>.</a:t>
-            </a:r>
-          </a:p>
-          <a:p>
-            <a:pPr>
-              <a:lnSpc>
-                <a:spcPct val="110000"/>
-              </a:lnSpc>
-            </a:pPr>
-            <a:r>
-              <a:rPr lang="en-GB" sz="1400" dirty="0" err="1"/>
-              <a:t>TechnicalBreaks</a:t>
-            </a:r>
-            <a:r>
-              <a:rPr lang="en-GB" sz="1400" dirty="0"/>
-              <a:t>: *id, </a:t>
-            </a:r>
-            <a:r>
-              <a:rPr lang="en-GB" sz="1400" dirty="0" err="1"/>
-              <a:t>stage_id</a:t>
-            </a:r>
-            <a:r>
-              <a:rPr lang="en-GB" sz="1400" dirty="0"/>
-              <a:t>, </a:t>
-            </a:r>
-            <a:r>
-              <a:rPr lang="en-GB" sz="1400" dirty="0" err="1"/>
-              <a:t>starts_at</a:t>
-            </a:r>
-            <a:r>
-              <a:rPr lang="en-GB" sz="1400" dirty="0"/>
-              <a:t>, </a:t>
-            </a:r>
-            <a:r>
-              <a:rPr lang="en-GB" sz="1400" dirty="0" err="1"/>
-              <a:t>ends_at</a:t>
-            </a:r>
-            <a:r>
-              <a:rPr lang="en-GB" sz="1400" dirty="0"/>
-              <a:t>, notes.</a:t>
-            </a:r>
-          </a:p>
-          <a:p>
-            <a:pPr>
-              <a:lnSpc>
-                <a:spcPct val="110000"/>
-              </a:lnSpc>
-            </a:pPr>
-            <a:r>
-              <a:rPr lang="en-GB" sz="1400" dirty="0"/>
-              <a:t>Volunteers: *id, name, </a:t>
-            </a:r>
-            <a:r>
-              <a:rPr lang="en-GB" sz="1400" dirty="0" err="1"/>
-              <a:t>contact_number</a:t>
-            </a:r>
-            <a:r>
-              <a:rPr lang="en-GB" sz="1400" dirty="0"/>
-              <a:t>, role.</a:t>
-            </a:r>
-          </a:p>
-          <a:p>
-            <a:pPr>
-              <a:lnSpc>
-                <a:spcPct val="110000"/>
-              </a:lnSpc>
-            </a:pPr>
-            <a:r>
-              <a:rPr lang="en-GB" sz="1400" dirty="0" err="1"/>
-              <a:t>VolunteerShifts</a:t>
-            </a:r>
-            <a:r>
-              <a:rPr lang="en-GB" sz="1400" dirty="0"/>
-              <a:t>: *id, </a:t>
-            </a:r>
-            <a:r>
-              <a:rPr lang="en-GB" sz="1400" dirty="0" err="1"/>
-              <a:t>volunteer_id</a:t>
-            </a:r>
-            <a:r>
-              <a:rPr lang="en-GB" sz="1400" dirty="0"/>
-              <a:t>, </a:t>
-            </a:r>
-            <a:r>
-              <a:rPr lang="en-GB" sz="1400" dirty="0" err="1"/>
-              <a:t>zone_id</a:t>
-            </a:r>
-            <a:r>
-              <a:rPr lang="en-GB" sz="1400" dirty="0"/>
-              <a:t>, </a:t>
-            </a:r>
-            <a:r>
-              <a:rPr lang="en-GB" sz="1400" dirty="0" err="1"/>
-              <a:t>starts_at</a:t>
-            </a:r>
-            <a:r>
-              <a:rPr lang="en-GB" sz="1400" dirty="0"/>
-              <a:t>, </a:t>
-            </a:r>
-            <a:r>
-              <a:rPr lang="en-GB" sz="1400" dirty="0" err="1"/>
-              <a:t>ends_at</a:t>
-            </a:r>
-            <a:r>
-              <a:rPr lang="en-GB" sz="1400" dirty="0"/>
-              <a:t>.</a:t>
-            </a:r>
-          </a:p>
-          <a:p>
-            <a:pPr>
-              <a:lnSpc>
-                <a:spcPct val="110000"/>
-              </a:lnSpc>
-            </a:pPr>
-            <a:r>
-              <a:rPr lang="en-GB" sz="1400" dirty="0"/>
-              <a:t>Partners: *id, name, </a:t>
-            </a:r>
-            <a:r>
-              <a:rPr lang="en-GB" sz="1400" dirty="0" err="1"/>
-              <a:t>contact_number</a:t>
-            </a:r>
-            <a:r>
-              <a:rPr lang="en-GB" sz="1400" dirty="0"/>
-              <a:t>.</a:t>
-            </a:r>
-          </a:p>
-          <a:p>
-            <a:pPr>
-              <a:lnSpc>
-                <a:spcPct val="110000"/>
-              </a:lnSpc>
-            </a:pPr>
-            <a:r>
-              <a:rPr lang="en-GB" sz="1400" dirty="0"/>
-              <a:t>Zones: *id, name, type, location.</a:t>
-            </a:r>
-            <a:endParaRPr lang="uk-UA" sz="1400" dirty="0"/>
-          </a:p>
-          <a:p>
-            <a:pPr>
-              <a:lnSpc>
-                <a:spcPct val="110000"/>
-              </a:lnSpc>
-            </a:pPr>
-            <a:r>
-              <a:rPr lang="en-GB" sz="1400" dirty="0" err="1"/>
-              <a:t>ActivationZones</a:t>
-            </a:r>
-            <a:r>
-              <a:rPr lang="en-GB" sz="1400" dirty="0"/>
-              <a:t>: *id, </a:t>
-            </a:r>
-            <a:r>
-              <a:rPr lang="en-GB" sz="1400" dirty="0" err="1"/>
-              <a:t>partner_id</a:t>
-            </a:r>
-            <a:r>
-              <a:rPr lang="en-GB" sz="1400" dirty="0"/>
-              <a:t>, </a:t>
-            </a:r>
-            <a:r>
-              <a:rPr lang="en-GB" sz="1400" dirty="0" err="1"/>
-              <a:t>zone_id</a:t>
-            </a:r>
-            <a:r>
-              <a:rPr lang="en-GB" sz="1400" dirty="0"/>
-              <a:t>, </a:t>
-            </a:r>
-            <a:r>
-              <a:rPr lang="en-GB" sz="1400" dirty="0" err="1"/>
-              <a:t>required_power</a:t>
-            </a:r>
-            <a:r>
-              <a:rPr lang="en-GB" sz="1400" dirty="0"/>
-              <a:t>, notes.</a:t>
-            </a:r>
-          </a:p>
-          <a:p>
-            <a:pPr>
-              <a:lnSpc>
-                <a:spcPct val="110000"/>
-              </a:lnSpc>
-            </a:pPr>
-            <a:r>
-              <a:rPr lang="en-GB" sz="1400" dirty="0" err="1"/>
-              <a:t>LogisticItems</a:t>
-            </a:r>
-            <a:r>
-              <a:rPr lang="en-GB" sz="1400" dirty="0"/>
-              <a:t>: *id, </a:t>
-            </a:r>
-            <a:r>
-              <a:rPr lang="en-GB" sz="1400" dirty="0" err="1"/>
-              <a:t>zone_id</a:t>
-            </a:r>
-            <a:r>
-              <a:rPr lang="en-GB" sz="1400" dirty="0"/>
-              <a:t>, name, quantity.</a:t>
-            </a:r>
-          </a:p>
-          <a:p>
-            <a:pPr>
-              <a:lnSpc>
-                <a:spcPct val="110000"/>
-              </a:lnSpc>
-            </a:pPr>
-            <a:r>
-              <a:rPr lang="en-GB" sz="1400" dirty="0"/>
-              <a:t>Tickets: *id, </a:t>
-            </a:r>
-            <a:r>
-              <a:rPr lang="en-GB" sz="1400" dirty="0" err="1"/>
-              <a:t>qr_code</a:t>
-            </a:r>
-            <a:r>
-              <a:rPr lang="en-GB" sz="1400" dirty="0"/>
-              <a:t>, type, </a:t>
-            </a:r>
-            <a:r>
-              <a:rPr lang="en-GB" sz="1400" dirty="0" err="1"/>
-              <a:t>buyer_name</a:t>
-            </a:r>
-            <a:r>
-              <a:rPr lang="en-GB" sz="1400" dirty="0"/>
-              <a:t>, </a:t>
-            </a:r>
-            <a:r>
-              <a:rPr lang="en-GB" sz="1400" dirty="0" err="1"/>
-              <a:t>contact_number</a:t>
-            </a:r>
-            <a:r>
-              <a:rPr lang="en-GB" sz="1400" dirty="0"/>
-              <a:t>, </a:t>
-            </a:r>
-            <a:r>
-              <a:rPr lang="en-GB" sz="1400" dirty="0" err="1"/>
-              <a:t>entrance_date</a:t>
-            </a:r>
-            <a:r>
-              <a:rPr lang="en-GB" sz="1400" dirty="0"/>
-              <a:t>, status.</a:t>
-            </a:r>
-          </a:p>
-          <a:p>
-            <a:pPr>
-              <a:lnSpc>
-                <a:spcPct val="110000"/>
-              </a:lnSpc>
-            </a:pPr>
-            <a:r>
-              <a:rPr lang="en-GB" sz="1400" dirty="0"/>
-              <a:t>Incidents: *id, </a:t>
-            </a:r>
-            <a:r>
-              <a:rPr lang="en-GB" sz="1400" dirty="0" err="1"/>
-              <a:t>zone_id</a:t>
-            </a:r>
-            <a:r>
-              <a:rPr lang="en-GB" sz="1400" dirty="0"/>
-              <a:t>, </a:t>
-            </a:r>
-            <a:r>
-              <a:rPr lang="en-GB" sz="1400" dirty="0" err="1"/>
-              <a:t>ticket_id</a:t>
-            </a:r>
-            <a:r>
-              <a:rPr lang="en-GB" sz="1400" dirty="0"/>
-              <a:t>, type, description, </a:t>
-            </a:r>
-            <a:r>
-              <a:rPr lang="en-GB" sz="1400" dirty="0" err="1"/>
-              <a:t>happened_at</a:t>
-            </a:r>
-            <a:r>
-              <a:rPr lang="en-GB" sz="1400" dirty="0"/>
-              <a:t>.</a:t>
-            </a:r>
-          </a:p>
-          <a:p>
-            <a:pPr>
-              <a:lnSpc>
-                <a:spcPct val="110000"/>
-              </a:lnSpc>
-            </a:pPr>
-            <a:r>
-              <a:rPr lang="en-GB" sz="1400" dirty="0" err="1"/>
-              <a:t>DailyReports</a:t>
-            </a:r>
-            <a:r>
-              <a:rPr lang="en-GB" sz="1400" dirty="0"/>
-              <a:t>: *id, date, summary, contents.</a:t>
             </a:r>
           </a:p>
           <a:p>
@@ -5636,7 +5486,7 @@
         <p:spPr>
           <a:xfrm>
             <a:off x="640080" y="1434438"/>
-            <a:ext cx="2983229" cy="2612976"/>
+            <a:ext cx="3677920" cy="2612976"/>
           </a:xfrm>
         </p:spPr>
         <p:txBody>
@@ -5646,50 +5496,29 @@
           <a:lstStyle/>
           <a:p>
             <a:r>
-              <a:rPr lang="en-US" sz="4400"/>
-              <a:t>Схема бази даних</a:t>
-            </a:r>
-          </a:p>
-        </p:txBody>
-      </p:sp>
-      <p:pic>
-        <p:nvPicPr>
-          <p:cNvPr id="5" name="Місце для вмісту 4">
-            <a:extLst>
-              <a:ext uri="{FF2B5EF4-FFF2-40B4-BE49-F238E27FC236}">
-                <a16:creationId xmlns:a16="http://schemas.microsoft.com/office/drawing/2014/main" id="{8F00DE0D-A0C0-7670-6577-3C36717C9BD8}"/>
-              </a:ext>
-            </a:extLst>
-          </p:cNvPr>
-          <p:cNvPicPr>
-            <a:picLocks noGrp="1" noChangeAspect="1"/>
-          </p:cNvPicPr>
-          <p:nvPr>
-            <p:ph idx="1"/>
-          </p:nvPr>
-        </p:nvPicPr>
-        <p:blipFill>
-          <a:blip r:embed="rId2">
-            <a:extLst>
-              <a:ext uri="{28A0092B-C50C-407E-A947-70E740481C1C}">
-                <a14:useLocalDpi xmlns:a14="http://schemas.microsoft.com/office/drawing/2010/main" val="0"/>
-              </a:ext>
-            </a:extLst>
-          </a:blip>
-          <a:stretch>
-            <a:fillRect/>
-          </a:stretch>
-        </p:blipFill>
-        <p:spPr>
-          <a:xfrm>
-            <a:off x="2966380" y="739118"/>
-            <a:ext cx="8512388" cy="5149999"/>
-          </a:xfrm>
-          <a:prstGeom prst="rect">
-            <a:avLst/>
-          </a:prstGeom>
-        </p:spPr>
-      </p:pic>
+              <a:rPr lang="en-US" sz="4400" dirty="0" err="1"/>
+              <a:t>Схема</a:t>
+            </a:r>
+            <a:r>
+              <a:rPr lang="en-US" sz="4400" dirty="0"/>
+              <a:t> </a:t>
+            </a:r>
+            <a:r>
+              <a:rPr lang="en-US" sz="4400" dirty="0" err="1"/>
+              <a:t>бази</a:t>
+            </a:r>
+            <a:r>
+              <a:rPr lang="en-US" sz="4400" dirty="0"/>
+              <a:t> </a:t>
+            </a:r>
+            <a:r>
+              <a:rPr lang="en-US" sz="4400" dirty="0" err="1"/>
+              <a:t>даних</a:t>
+            </a:r>
+            <a:endParaRPr lang="en-US" sz="4400" dirty="0"/>
+          </a:p>
+        </p:txBody>
+      </p:sp>
       <p:cxnSp>
         <p:nvCxnSpPr>
           <p:cNvPr id="18" name="Straight Connector 13">
@@ -5738,6 +5567,41 @@
           </a:fontRef>
         </p:style>
       </p:cxnSp>
+      <p:pic>
+        <p:nvPicPr>
+          <p:cNvPr id="7" name="Місце для вмісту 6" descr="Зображення, що містить текст, знімок екрана, схема, Паралель&#10;&#10;Вміст на основі ШІ може бути неправильним.">
+            <a:extLst>
+              <a:ext uri="{FF2B5EF4-FFF2-40B4-BE49-F238E27FC236}">
+                <a16:creationId xmlns:a16="http://schemas.microsoft.com/office/drawing/2014/main" id="{B63ABB99-18D7-0F19-0BC4-7C4B07FE7A5C}"/>
+              </a:ext>
+            </a:extLst>
+          </p:cNvPr>
+          <p:cNvPicPr>
+            <a:picLocks noGrp="1" noChangeAspect="1"/>
+          </p:cNvPicPr>
+          <p:nvPr>
+            <p:ph idx="1"/>
+          </p:nvPr>
+        </p:nvPicPr>
+        <p:blipFill>
+          <a:blip r:embed="rId2">
+            <a:extLst>
+              <a:ext uri="{28A0092B-C50C-407E-A947-70E740481C1C}">
+                <a14:useLocalDpi xmlns:a14="http://schemas.microsoft.com/office/drawing/2010/main" val="0"/>
+              </a:ext>
+            </a:extLst>
+          </a:blip>
+          <a:stretch>
+            <a:fillRect/>
+          </a:stretch>
+        </p:blipFill>
+        <p:spPr>
+          <a:xfrm>
+            <a:off x="5911088" y="166763"/>
+            <a:ext cx="5567680" cy="5939258"/>
+          </a:xfrm>
+        </p:spPr>
+      </p:pic>
     </p:spTree>
     <p:extLst>
       <p:ext uri="{BB962C8B-B14F-4D97-AF65-F5344CB8AC3E}">
@@ -5954,7 +5818,7 @@
         <p:spPr>
           <a:xfrm>
             <a:off x="640080" y="2633236"/>
-            <a:ext cx="4775200" cy="3666980"/>
+            <a:ext cx="3566160" cy="3666980"/>
           </a:xfrm>
         </p:spPr>
         <p:txBody>
@@ -5981,10 +5845,10 @@
       </p:sp>
       <p:pic>
         <p:nvPicPr>
-          <p:cNvPr id="7" name="Рисунок 6" descr="Зображення, що містить текст, знімок екрана, програмне забезпечення, Мультимедійне програмне забезпечення&#10;&#10;Вміст на основі ШІ може бути неправильним.">
-            <a:extLst>
-              <a:ext uri="{FF2B5EF4-FFF2-40B4-BE49-F238E27FC236}">
-                <a16:creationId xmlns:a16="http://schemas.microsoft.com/office/drawing/2014/main" id="{83993444-BDDD-504C-95E3-4824CDF97B10}"/>
+          <p:cNvPr id="5" name="Рисунок 4" descr="Зображення, що містить текст, знімок екрана, програмне забезпечення, число&#10;&#10;Вміст на основі ШІ може бути неправильним.">
+            <a:extLst>
+              <a:ext uri="{FF2B5EF4-FFF2-40B4-BE49-F238E27FC236}">
+                <a16:creationId xmlns:a16="http://schemas.microsoft.com/office/drawing/2014/main" id="{31682EEE-F27B-80A8-C977-41BB158B37BB}"/>
               </a:ext>
             </a:extLst>
           </p:cNvPr>
@@ -6007,8 +5871,8 @@
         </p:blipFill>
         <p:spPr>
           <a:xfrm>
-            <a:off x="5985547" y="1524000"/>
-            <a:ext cx="5545462" cy="4776216"/>
+            <a:off x="4331312" y="1015761"/>
+            <a:ext cx="7308900" cy="4735941"/>
           </a:xfrm>
           <a:prstGeom prst="rect">
             <a:avLst/>
@@ -6356,19 +6220,17 @@
       </p:sp>
       <p:pic>
         <p:nvPicPr>
-          <p:cNvPr id="5" name="Місце для вмісту 4">
-            <a:extLst>
-              <a:ext uri="{FF2B5EF4-FFF2-40B4-BE49-F238E27FC236}">
-                <a16:creationId xmlns:a16="http://schemas.microsoft.com/office/drawing/2014/main" id="{4FC8F3AF-7B84-C0C8-413A-F9BE555C96B8}"/>
+          <p:cNvPr id="4" name="Рисунок 3">
+            <a:extLst>
+              <a:ext uri="{FF2B5EF4-FFF2-40B4-BE49-F238E27FC236}">
+                <a16:creationId xmlns:a16="http://schemas.microsoft.com/office/drawing/2014/main" id="{177415AA-DBB0-F8B7-12B2-5853CA444B3F}"/>
               </a:ext>
             </a:extLst>
           </p:cNvPr>
           <p:cNvPicPr>
-            <a:picLocks noGrp="1" noChangeAspect="1"/>
+            <a:picLocks noChangeAspect="1"/>
           </p:cNvPicPr>
-          <p:nvPr>
-            <p:ph idx="1"/>
-          </p:nvPr>
+          <p:nvPr/>
         </p:nvPicPr>
         <p:blipFill>
           <a:blip r:embed="rId2"/>
@@ -6378,8 +6240,8 @@
         </p:blipFill>
         <p:spPr>
           <a:xfrm>
-            <a:off x="650081" y="2532608"/>
-            <a:ext cx="10891837" cy="1792783"/>
+            <a:off x="640079" y="2370048"/>
+            <a:ext cx="8963915" cy="1792783"/>
           </a:xfrm>
           <a:prstGeom prst="rect">
             <a:avLst/>
@@ -6388,10 +6250,10 @@
       </p:pic>
       <p:pic>
         <p:nvPicPr>
-          <p:cNvPr id="7" name="Рисунок 6">
-            <a:extLst>
-              <a:ext uri="{FF2B5EF4-FFF2-40B4-BE49-F238E27FC236}">
-                <a16:creationId xmlns:a16="http://schemas.microsoft.com/office/drawing/2014/main" id="{CAA26E73-B609-B522-A05A-FFBE39BCAFC6}"/>
+          <p:cNvPr id="10" name="Рисунок 9">
+            <a:extLst>
+              <a:ext uri="{FF2B5EF4-FFF2-40B4-BE49-F238E27FC236}">
+                <a16:creationId xmlns:a16="http://schemas.microsoft.com/office/drawing/2014/main" id="{DF7395FA-AEDD-6500-C1EF-E56AB9444D31}"/>
               </a:ext>
             </a:extLst>
           </p:cNvPr>
@@ -6408,8 +6270,8 @@
         </p:blipFill>
         <p:spPr>
           <a:xfrm>
-            <a:off x="650081" y="4743449"/>
-            <a:ext cx="6257925" cy="742950"/>
+            <a:off x="640079" y="4448810"/>
+            <a:ext cx="6259207" cy="1159510"/>
           </a:xfrm>
           <a:prstGeom prst="rect">
             <a:avLst/>
@@ -6477,19 +6339,17 @@
       </p:sp>
       <p:pic>
         <p:nvPicPr>
-          <p:cNvPr id="5" name="Місце для вмісту 4">
-            <a:extLst>
-              <a:ext uri="{FF2B5EF4-FFF2-40B4-BE49-F238E27FC236}">
-                <a16:creationId xmlns:a16="http://schemas.microsoft.com/office/drawing/2014/main" id="{CD4A83A2-B56D-7701-7E49-BF12029C9111}"/>
+          <p:cNvPr id="8" name="Рисунок 7">
+            <a:extLst>
+              <a:ext uri="{FF2B5EF4-FFF2-40B4-BE49-F238E27FC236}">
+                <a16:creationId xmlns:a16="http://schemas.microsoft.com/office/drawing/2014/main" id="{ADF7EA4F-6CEE-4947-2E9F-01307DD2FE7F}"/>
               </a:ext>
             </a:extLst>
           </p:cNvPr>
           <p:cNvPicPr>
-            <a:picLocks noGrp="1" noChangeAspect="1"/>
+            <a:picLocks noChangeAspect="1"/>
           </p:cNvPicPr>
-          <p:nvPr>
-            <p:ph idx="1"/>
-          </p:nvPr>
+          <p:nvPr/>
         </p:nvPicPr>
         <p:blipFill>
           <a:blip r:embed="rId2"/>
@@ -6499,8 +6359,8 @@
         </p:blipFill>
         <p:spPr>
           <a:xfrm>
-            <a:off x="640078" y="2225040"/>
-            <a:ext cx="10708641" cy="1944788"/>
+            <a:off x="640078" y="2286000"/>
+            <a:ext cx="11033760" cy="1463040"/>
           </a:xfrm>
           <a:prstGeom prst="rect">
             <a:avLst/>
@@ -6509,10 +6369,10 @@
       </p:pic>
       <p:pic>
         <p:nvPicPr>
-          <p:cNvPr id="7" name="Рисунок 6">
-            <a:extLst>
-              <a:ext uri="{FF2B5EF4-FFF2-40B4-BE49-F238E27FC236}">
-                <a16:creationId xmlns:a16="http://schemas.microsoft.com/office/drawing/2014/main" id="{52F83040-F2DC-6B51-7420-20D019B08C04}"/>
+          <p:cNvPr id="10" name="Рисунок 9">
+            <a:extLst>
+              <a:ext uri="{FF2B5EF4-FFF2-40B4-BE49-F238E27FC236}">
+                <a16:creationId xmlns:a16="http://schemas.microsoft.com/office/drawing/2014/main" id="{8F06391E-5F23-BB2A-0C8C-D4AE3B7702E9}"/>
               </a:ext>
             </a:extLst>
           </p:cNvPr>
@@ -6529,8 +6389,8 @@
         </p:blipFill>
         <p:spPr>
           <a:xfrm>
-            <a:off x="640078" y="4500562"/>
-            <a:ext cx="4565275" cy="731838"/>
+            <a:off x="640078" y="4110988"/>
+            <a:ext cx="7731762" cy="695259"/>
           </a:xfrm>
           <a:prstGeom prst="rect">
             <a:avLst/>
@@ -6598,19 +6458,17 @@
       </p:sp>
       <p:pic>
         <p:nvPicPr>
-          <p:cNvPr id="5" name="Місце для вмісту 4">
-            <a:extLst>
-              <a:ext uri="{FF2B5EF4-FFF2-40B4-BE49-F238E27FC236}">
-                <a16:creationId xmlns:a16="http://schemas.microsoft.com/office/drawing/2014/main" id="{2FCD667A-FDE4-B7BF-835D-2D596517E1B4}"/>
+          <p:cNvPr id="8" name="Рисунок 7">
+            <a:extLst>
+              <a:ext uri="{FF2B5EF4-FFF2-40B4-BE49-F238E27FC236}">
+                <a16:creationId xmlns:a16="http://schemas.microsoft.com/office/drawing/2014/main" id="{140FFE80-6E2C-49E5-D2F6-576F6158A11B}"/>
               </a:ext>
             </a:extLst>
           </p:cNvPr>
           <p:cNvPicPr>
-            <a:picLocks noGrp="1" noChangeAspect="1"/>
+            <a:picLocks noChangeAspect="1"/>
           </p:cNvPicPr>
-          <p:nvPr>
-            <p:ph idx="1"/>
-          </p:nvPr>
+          <p:nvPr/>
         </p:nvPicPr>
         <p:blipFill>
           <a:blip r:embed="rId2"/>
@@ -6620,8 +6478,8 @@
         </p:blipFill>
         <p:spPr>
           <a:xfrm>
-            <a:off x="660992" y="2302192"/>
-            <a:ext cx="10642344" cy="2086928"/>
+            <a:off x="640079" y="2217420"/>
+            <a:ext cx="10734675" cy="2171700"/>
           </a:xfrm>
           <a:prstGeom prst="rect">
             <a:avLst/>
@@ -6630,10 +6488,10 @@
       </p:pic>
       <p:pic>
         <p:nvPicPr>
-          <p:cNvPr id="7" name="Рисунок 6">
-            <a:extLst>
-              <a:ext uri="{FF2B5EF4-FFF2-40B4-BE49-F238E27FC236}">
-                <a16:creationId xmlns:a16="http://schemas.microsoft.com/office/drawing/2014/main" id="{FE09B53B-CC5F-462A-08BF-1F3A049A429E}"/>
+          <p:cNvPr id="10" name="Рисунок 9">
+            <a:extLst>
+              <a:ext uri="{FF2B5EF4-FFF2-40B4-BE49-F238E27FC236}">
+                <a16:creationId xmlns:a16="http://schemas.microsoft.com/office/drawing/2014/main" id="{60C42803-E38A-AEE1-0B8B-96AD77383300}"/>
               </a:ext>
             </a:extLst>
           </p:cNvPr>
@@ -6650,8 +6508,8 @@
         </p:blipFill>
         <p:spPr>
           <a:xfrm>
-            <a:off x="660992" y="4648200"/>
-            <a:ext cx="5867400" cy="1828800"/>
+            <a:off x="640079" y="4455160"/>
+            <a:ext cx="6512561" cy="2313565"/>
           </a:xfrm>
           <a:prstGeom prst="rect">
             <a:avLst/>

</xml_diff>